<commit_message>
Fix pptx for tests and indent XML
</commit_message>
<xml_diff>
--- a/test/datasets/image/pptx-simple/pptx-simple.pptx
+++ b/test/datasets/image/pptx-simple/pptx-simple.pptx
@@ -7,8 +7,8 @@
   <p:sldIdLst>
     <p:sldId id="256" r:id="rId2"/>
     <p:sldId id="257" r:id="rId3"/>
-    <p:sldId id="258" r:id="rId4"/>
-    <p:sldId id="260" r:id="rId5"/>
+    <p:sldId id="260" r:id="rId4"/>
+    <p:sldId id="261" r:id="rId5"/>
   </p:sldIdLst>
   <p:sldSz cx="12192000" cy="6858000"/>
   <p:notesSz cx="6858000" cy="9144000"/>
@@ -264,7 +264,7 @@
           <a:p>
             <a:fld id="{226441E3-5DBC-BF48-8218-8C7F8E3AB3C5}" type="datetimeFigureOut">
               <a:rPr lang="en-FR" smtClean="0"/>
-              <a:t>11/10/2022</a:t>
+              <a:t>13/10/2022</a:t>
             </a:fld>
             <a:endParaRPr lang="en-FR"/>
           </a:p>
@@ -464,7 +464,7 @@
           <a:p>
             <a:fld id="{226441E3-5DBC-BF48-8218-8C7F8E3AB3C5}" type="datetimeFigureOut">
               <a:rPr lang="en-FR" smtClean="0"/>
-              <a:t>11/10/2022</a:t>
+              <a:t>13/10/2022</a:t>
             </a:fld>
             <a:endParaRPr lang="en-FR"/>
           </a:p>
@@ -674,7 +674,7 @@
           <a:p>
             <a:fld id="{226441E3-5DBC-BF48-8218-8C7F8E3AB3C5}" type="datetimeFigureOut">
               <a:rPr lang="en-FR" smtClean="0"/>
-              <a:t>11/10/2022</a:t>
+              <a:t>13/10/2022</a:t>
             </a:fld>
             <a:endParaRPr lang="en-FR"/>
           </a:p>
@@ -874,7 +874,7 @@
           <a:p>
             <a:fld id="{226441E3-5DBC-BF48-8218-8C7F8E3AB3C5}" type="datetimeFigureOut">
               <a:rPr lang="en-FR" smtClean="0"/>
-              <a:t>11/10/2022</a:t>
+              <a:t>13/10/2022</a:t>
             </a:fld>
             <a:endParaRPr lang="en-FR"/>
           </a:p>
@@ -1150,7 +1150,7 @@
           <a:p>
             <a:fld id="{226441E3-5DBC-BF48-8218-8C7F8E3AB3C5}" type="datetimeFigureOut">
               <a:rPr lang="en-FR" smtClean="0"/>
-              <a:t>11/10/2022</a:t>
+              <a:t>13/10/2022</a:t>
             </a:fld>
             <a:endParaRPr lang="en-FR"/>
           </a:p>
@@ -1418,7 +1418,7 @@
           <a:p>
             <a:fld id="{226441E3-5DBC-BF48-8218-8C7F8E3AB3C5}" type="datetimeFigureOut">
               <a:rPr lang="en-FR" smtClean="0"/>
-              <a:t>11/10/2022</a:t>
+              <a:t>13/10/2022</a:t>
             </a:fld>
             <a:endParaRPr lang="en-FR"/>
           </a:p>
@@ -1833,7 +1833,7 @@
           <a:p>
             <a:fld id="{226441E3-5DBC-BF48-8218-8C7F8E3AB3C5}" type="datetimeFigureOut">
               <a:rPr lang="en-FR" smtClean="0"/>
-              <a:t>11/10/2022</a:t>
+              <a:t>13/10/2022</a:t>
             </a:fld>
             <a:endParaRPr lang="en-FR"/>
           </a:p>
@@ -1975,7 +1975,7 @@
           <a:p>
             <a:fld id="{226441E3-5DBC-BF48-8218-8C7F8E3AB3C5}" type="datetimeFigureOut">
               <a:rPr lang="en-FR" smtClean="0"/>
-              <a:t>11/10/2022</a:t>
+              <a:t>13/10/2022</a:t>
             </a:fld>
             <a:endParaRPr lang="en-FR"/>
           </a:p>
@@ -2088,7 +2088,7 @@
           <a:p>
             <a:fld id="{226441E3-5DBC-BF48-8218-8C7F8E3AB3C5}" type="datetimeFigureOut">
               <a:rPr lang="en-FR" smtClean="0"/>
-              <a:t>11/10/2022</a:t>
+              <a:t>13/10/2022</a:t>
             </a:fld>
             <a:endParaRPr lang="en-FR"/>
           </a:p>
@@ -2401,7 +2401,7 @@
           <a:p>
             <a:fld id="{226441E3-5DBC-BF48-8218-8C7F8E3AB3C5}" type="datetimeFigureOut">
               <a:rPr lang="en-FR" smtClean="0"/>
-              <a:t>11/10/2022</a:t>
+              <a:t>13/10/2022</a:t>
             </a:fld>
             <a:endParaRPr lang="en-FR"/>
           </a:p>
@@ -2690,7 +2690,7 @@
           <a:p>
             <a:fld id="{226441E3-5DBC-BF48-8218-8C7F8E3AB3C5}" type="datetimeFigureOut">
               <a:rPr lang="en-FR" smtClean="0"/>
-              <a:t>11/10/2022</a:t>
+              <a:t>13/10/2022</a:t>
             </a:fld>
             <a:endParaRPr lang="en-FR"/>
           </a:p>
@@ -2933,7 +2933,7 @@
           <a:p>
             <a:fld id="{226441E3-5DBC-BF48-8218-8C7F8E3AB3C5}" type="datetimeFigureOut">
               <a:rPr lang="en-FR" smtClean="0"/>
-              <a:t>11/10/2022</a:t>
+              <a:t>13/10/2022</a:t>
             </a:fld>
             <a:endParaRPr lang="en-FR"/>
           </a:p>
@@ -3352,10 +3352,10 @@
       </p:grpSpPr>
       <p:pic>
         <p:nvPicPr>
-          <p:cNvPr id="5" name="Picture 4" descr="{d.image}">
-            <a:extLst>
-              <a:ext uri="{FF2B5EF4-FFF2-40B4-BE49-F238E27FC236}">
-                <a16:creationId xmlns:a16="http://schemas.microsoft.com/office/drawing/2014/main" id="{75F52970-A337-F7FC-90B6-5B954AC9558F}"/>
+          <p:cNvPr id="3" name="Picture 2" descr="{d.image}">
+            <a:extLst>
+              <a:ext uri="{FF2B5EF4-FFF2-40B4-BE49-F238E27FC236}">
+                <a16:creationId xmlns:a16="http://schemas.microsoft.com/office/drawing/2014/main" id="{0A4B286C-803D-7D85-DF40-45D35B38E74E}"/>
               </a:ext>
             </a:extLst>
           </p:cNvPr>
@@ -3372,8 +3372,8 @@
         </p:blipFill>
         <p:spPr>
           <a:xfrm>
-            <a:off x="2660007" y="924548"/>
-            <a:ext cx="6871986" cy="4581324"/>
+            <a:off x="4191000" y="2159000"/>
+            <a:ext cx="3810000" cy="2540000"/>
           </a:xfrm>
           <a:prstGeom prst="rect">
             <a:avLst/>
@@ -3412,10 +3412,10 @@
       </p:grpSpPr>
       <p:pic>
         <p:nvPicPr>
-          <p:cNvPr id="4" name="Picture 3" descr="{d.image2}">
-            <a:extLst>
-              <a:ext uri="{FF2B5EF4-FFF2-40B4-BE49-F238E27FC236}">
-                <a16:creationId xmlns:a16="http://schemas.microsoft.com/office/drawing/2014/main" id="{1B69911A-986E-4A2C-87F7-D746D2BAA4AF}"/>
+          <p:cNvPr id="7" name="Picture 6" descr="{d.image2}">
+            <a:extLst>
+              <a:ext uri="{FF2B5EF4-FFF2-40B4-BE49-F238E27FC236}">
+                <a16:creationId xmlns:a16="http://schemas.microsoft.com/office/drawing/2014/main" id="{D6886621-DB5B-AC4E-948A-9CF713335AB9}"/>
               </a:ext>
             </a:extLst>
           </p:cNvPr>
@@ -3432,8 +3432,8 @@
         </p:blipFill>
         <p:spPr>
           <a:xfrm>
-            <a:off x="2660007" y="924548"/>
-            <a:ext cx="6871986" cy="4581324"/>
+            <a:off x="4191000" y="2159000"/>
+            <a:ext cx="3810000" cy="2540000"/>
           </a:xfrm>
           <a:prstGeom prst="rect">
             <a:avLst/>
@@ -3456,14 +3456,6 @@
 <file path=ppt/slides/slide3.xml><?xml version="1.0" encoding="utf-8"?>
 <p:sld xmlns:a="http://schemas.openxmlformats.org/drawingml/2006/main" xmlns:r="http://schemas.openxmlformats.org/officeDocument/2006/relationships" xmlns:p="http://schemas.openxmlformats.org/presentationml/2006/main">
   <p:cSld>
-    <p:bg>
-      <p:bgPr>
-        <a:solidFill>
-          <a:schemeClr val="bg1"/>
-        </a:solidFill>
-        <a:effectLst/>
-      </p:bgPr>
-    </p:bg>
     <p:spTree>
       <p:nvGrpSpPr>
         <p:cNvPr id="1" name=""/>
@@ -3478,179 +3470,12 @@
           <a:chExt cx="0" cy="0"/>
         </a:xfrm>
       </p:grpSpPr>
-      <p:sp>
-        <p:nvSpPr>
-          <p:cNvPr id="9" name="Freeform: Shape 8">
-            <a:extLst>
-              <a:ext uri="{FF2B5EF4-FFF2-40B4-BE49-F238E27FC236}">
-                <a16:creationId xmlns:a16="http://schemas.microsoft.com/office/drawing/2014/main" id="{B670DBD5-770C-4383-9F54-5B86E86BD5BB}"/>
-              </a:ext>
-              <a:ext uri="{C183D7F6-B498-43B3-948B-1728B52AA6E4}">
-                <adec:decorative xmlns:adec="http://schemas.microsoft.com/office/drawing/2017/decorative" val="1"/>
-              </a:ext>
-            </a:extLst>
-          </p:cNvPr>
-          <p:cNvSpPr>
-            <a:spLocks noGrp="1" noRot="1" noChangeAspect="1" noMove="1" noResize="1" noEditPoints="1" noAdjustHandles="1" noChangeArrowheads="1" noChangeShapeType="1" noTextEdit="1"/>
-          </p:cNvSpPr>
-          <p:nvPr>
-            <p:extLst>
-              <p:ext uri="{386F3935-93C4-4BCD-93E2-E3B085C9AB24}">
-                <p16:designElem xmlns:p16="http://schemas.microsoft.com/office/powerpoint/2015/main" val="1"/>
-              </p:ext>
-            </p:extLst>
-          </p:nvPr>
-        </p:nvSpPr>
-        <p:spPr>
-          <a:xfrm>
-            <a:off x="1210277" y="0"/>
-            <a:ext cx="9771446" cy="6858000"/>
-          </a:xfrm>
-          <a:custGeom>
-            <a:avLst/>
-            <a:gdLst>
-              <a:gd name="connsiteX0" fmla="*/ 1422188 w 9771446"/>
-              <a:gd name="connsiteY0" fmla="*/ 0 h 6858000"/>
-              <a:gd name="connsiteX1" fmla="*/ 8349258 w 9771446"/>
-              <a:gd name="connsiteY1" fmla="*/ 0 h 6858000"/>
-              <a:gd name="connsiteX2" fmla="*/ 8502224 w 9771446"/>
-              <a:gd name="connsiteY2" fmla="*/ 159673 h 6858000"/>
-              <a:gd name="connsiteX3" fmla="*/ 9771446 w 9771446"/>
-              <a:gd name="connsiteY3" fmla="*/ 3429001 h 6858000"/>
-              <a:gd name="connsiteX4" fmla="*/ 8502224 w 9771446"/>
-              <a:gd name="connsiteY4" fmla="*/ 6698330 h 6858000"/>
-              <a:gd name="connsiteX5" fmla="*/ 8349260 w 9771446"/>
-              <a:gd name="connsiteY5" fmla="*/ 6858000 h 6858000"/>
-              <a:gd name="connsiteX6" fmla="*/ 1422186 w 9771446"/>
-              <a:gd name="connsiteY6" fmla="*/ 6858000 h 6858000"/>
-              <a:gd name="connsiteX7" fmla="*/ 1269223 w 9771446"/>
-              <a:gd name="connsiteY7" fmla="*/ 6698330 h 6858000"/>
-              <a:gd name="connsiteX8" fmla="*/ 0 w 9771446"/>
-              <a:gd name="connsiteY8" fmla="*/ 3429001 h 6858000"/>
-              <a:gd name="connsiteX9" fmla="*/ 1269223 w 9771446"/>
-              <a:gd name="connsiteY9" fmla="*/ 159673 h 6858000"/>
-            </a:gdLst>
-            <a:ahLst/>
-            <a:cxnLst>
-              <a:cxn ang="0">
-                <a:pos x="connsiteX0" y="connsiteY0"/>
-              </a:cxn>
-              <a:cxn ang="0">
-                <a:pos x="connsiteX1" y="connsiteY1"/>
-              </a:cxn>
-              <a:cxn ang="0">
-                <a:pos x="connsiteX2" y="connsiteY2"/>
-              </a:cxn>
-              <a:cxn ang="0">
-                <a:pos x="connsiteX3" y="connsiteY3"/>
-              </a:cxn>
-              <a:cxn ang="0">
-                <a:pos x="connsiteX4" y="connsiteY4"/>
-              </a:cxn>
-              <a:cxn ang="0">
-                <a:pos x="connsiteX5" y="connsiteY5"/>
-              </a:cxn>
-              <a:cxn ang="0">
-                <a:pos x="connsiteX6" y="connsiteY6"/>
-              </a:cxn>
-              <a:cxn ang="0">
-                <a:pos x="connsiteX7" y="connsiteY7"/>
-              </a:cxn>
-              <a:cxn ang="0">
-                <a:pos x="connsiteX8" y="connsiteY8"/>
-              </a:cxn>
-              <a:cxn ang="0">
-                <a:pos x="connsiteX9" y="connsiteY9"/>
-              </a:cxn>
-            </a:cxnLst>
-            <a:rect l="l" t="t" r="r" b="b"/>
-            <a:pathLst>
-              <a:path w="9771446" h="6858000">
-                <a:moveTo>
-                  <a:pt x="1422188" y="0"/>
-                </a:moveTo>
-                <a:lnTo>
-                  <a:pt x="8349258" y="0"/>
-                </a:lnTo>
-                <a:lnTo>
-                  <a:pt x="8502224" y="159673"/>
-                </a:lnTo>
-                <a:cubicBezTo>
-                  <a:pt x="9290813" y="1023162"/>
-                  <a:pt x="9771446" y="2170221"/>
-                  <a:pt x="9771446" y="3429001"/>
-                </a:cubicBezTo>
-                <a:cubicBezTo>
-                  <a:pt x="9771446" y="4687781"/>
-                  <a:pt x="9290813" y="5834840"/>
-                  <a:pt x="8502224" y="6698330"/>
-                </a:cubicBezTo>
-                <a:lnTo>
-                  <a:pt x="8349260" y="6858000"/>
-                </a:lnTo>
-                <a:lnTo>
-                  <a:pt x="1422186" y="6858000"/>
-                </a:lnTo>
-                <a:lnTo>
-                  <a:pt x="1269223" y="6698330"/>
-                </a:lnTo>
-                <a:cubicBezTo>
-                  <a:pt x="480633" y="5834840"/>
-                  <a:pt x="0" y="4687781"/>
-                  <a:pt x="0" y="3429001"/>
-                </a:cubicBezTo>
-                <a:cubicBezTo>
-                  <a:pt x="0" y="2170221"/>
-                  <a:pt x="480633" y="1023162"/>
-                  <a:pt x="1269223" y="159673"/>
-                </a:cubicBezTo>
-                <a:close/>
-              </a:path>
-            </a:pathLst>
-          </a:custGeom>
-          <a:solidFill>
-            <a:schemeClr val="bg1">
-              <a:lumMod val="85000"/>
-              <a:alpha val="62000"/>
-            </a:schemeClr>
-          </a:solidFill>
-          <a:ln>
-            <a:noFill/>
-          </a:ln>
-        </p:spPr>
-        <p:style>
-          <a:lnRef idx="2">
-            <a:schemeClr val="accent1">
-              <a:shade val="50000"/>
-            </a:schemeClr>
-          </a:lnRef>
-          <a:fillRef idx="1">
-            <a:schemeClr val="accent1"/>
-          </a:fillRef>
-          <a:effectRef idx="0">
-            <a:schemeClr val="accent1"/>
-          </a:effectRef>
-          <a:fontRef idx="minor">
-            <a:schemeClr val="lt1"/>
-          </a:fontRef>
-        </p:style>
-        <p:txBody>
-          <a:bodyPr wrap="square" rtlCol="0" anchor="ctr">
-            <a:noAutofit/>
-          </a:bodyPr>
-          <a:lstStyle/>
-          <a:p>
-            <a:pPr algn="ctr"/>
-            <a:endParaRPr lang="en-US"/>
-          </a:p>
-        </p:txBody>
-      </p:sp>
       <p:pic>
         <p:nvPicPr>
-          <p:cNvPr id="4" name="Picture 3" descr="{d.image3}">
-            <a:extLst>
-              <a:ext uri="{FF2B5EF4-FFF2-40B4-BE49-F238E27FC236}">
-                <a16:creationId xmlns:a16="http://schemas.microsoft.com/office/drawing/2014/main" id="{C791B0EF-BFF4-A5E1-B18C-B97F170B7BB6}"/>
+          <p:cNvPr id="2" name="Picture 1" descr="{d.list[0].image4}">
+            <a:extLst>
+              <a:ext uri="{FF2B5EF4-FFF2-40B4-BE49-F238E27FC236}">
+                <a16:creationId xmlns:a16="http://schemas.microsoft.com/office/drawing/2014/main" id="{468336E9-0D8B-3E09-16D7-712284745244}"/>
               </a:ext>
             </a:extLst>
           </p:cNvPr>
@@ -3659,72 +3484,26 @@
           </p:cNvPicPr>
           <p:nvPr/>
         </p:nvPicPr>
-        <p:blipFill rotWithShape="1">
+        <p:blipFill>
           <a:blip r:embed="rId2"/>
-          <a:srcRect l="5611" r="4153" b="-1"/>
-          <a:stretch/>
+          <a:stretch>
+            <a:fillRect/>
+          </a:stretch>
         </p:blipFill>
         <p:spPr>
           <a:xfrm>
-            <a:off x="1460597" y="10"/>
-            <a:ext cx="9270806" cy="6857990"/>
+            <a:off x="4191000" y="2159000"/>
+            <a:ext cx="3810000" cy="2540000"/>
           </a:xfrm>
-          <a:custGeom>
+          <a:prstGeom prst="rect">
             <a:avLst/>
-            <a:gdLst/>
-            <a:ahLst/>
-            <a:cxnLst/>
-            <a:rect l="l" t="t" r="r" b="b"/>
-            <a:pathLst>
-              <a:path w="9270806" h="6858000">
-                <a:moveTo>
-                  <a:pt x="1503712" y="0"/>
-                </a:moveTo>
-                <a:lnTo>
-                  <a:pt x="7767094" y="0"/>
-                </a:lnTo>
-                <a:lnTo>
-                  <a:pt x="7913128" y="139721"/>
-                </a:lnTo>
-                <a:cubicBezTo>
-                  <a:pt x="8751971" y="981521"/>
-                  <a:pt x="9270806" y="2144457"/>
-                  <a:pt x="9270806" y="3429000"/>
-                </a:cubicBezTo>
-                <a:cubicBezTo>
-                  <a:pt x="9270806" y="4713544"/>
-                  <a:pt x="8751971" y="5876479"/>
-                  <a:pt x="7913128" y="6718279"/>
-                </a:cubicBezTo>
-                <a:lnTo>
-                  <a:pt x="7767094" y="6858000"/>
-                </a:lnTo>
-                <a:lnTo>
-                  <a:pt x="1503712" y="6858000"/>
-                </a:lnTo>
-                <a:lnTo>
-                  <a:pt x="1357679" y="6718279"/>
-                </a:lnTo>
-                <a:cubicBezTo>
-                  <a:pt x="518835" y="5876479"/>
-                  <a:pt x="0" y="4713544"/>
-                  <a:pt x="0" y="3429000"/>
-                </a:cubicBezTo>
-                <a:cubicBezTo>
-                  <a:pt x="0" y="2144457"/>
-                  <a:pt x="518835" y="981521"/>
-                  <a:pt x="1357679" y="139721"/>
-                </a:cubicBezTo>
-                <a:close/>
-              </a:path>
-            </a:pathLst>
-          </a:custGeom>
+          </a:prstGeom>
         </p:spPr>
       </p:pic>
     </p:spTree>
     <p:extLst>
       <p:ext uri="{BB962C8B-B14F-4D97-AF65-F5344CB8AC3E}">
-        <p14:creationId xmlns:p14="http://schemas.microsoft.com/office/powerpoint/2010/main" val="3049116128"/>
+        <p14:creationId xmlns:p14="http://schemas.microsoft.com/office/powerpoint/2010/main" val="3250746773"/>
       </p:ext>
     </p:extLst>
   </p:cSld>
@@ -3753,10 +3532,10 @@
       </p:grpSpPr>
       <p:pic>
         <p:nvPicPr>
-          <p:cNvPr id="4" name="Picture 3" descr="{d.list[0].image4}">
-            <a:extLst>
-              <a:ext uri="{FF2B5EF4-FFF2-40B4-BE49-F238E27FC236}">
-                <a16:creationId xmlns:a16="http://schemas.microsoft.com/office/drawing/2014/main" id="{1B69911A-986E-4A2C-87F7-D746D2BAA4AF}"/>
+          <p:cNvPr id="7" name="Picture 6" descr="{d.code:barcode(code39)}">
+            <a:extLst>
+              <a:ext uri="{FF2B5EF4-FFF2-40B4-BE49-F238E27FC236}">
+                <a16:creationId xmlns:a16="http://schemas.microsoft.com/office/drawing/2014/main" id="{9E101C00-ECD5-DC6D-E9E6-D10E80A75CEE}"/>
               </a:ext>
             </a:extLst>
           </p:cNvPr>
@@ -3773,8 +3552,8 @@
         </p:blipFill>
         <p:spPr>
           <a:xfrm>
-            <a:off x="2660007" y="924548"/>
-            <a:ext cx="6871986" cy="4581324"/>
+            <a:off x="4191000" y="2159000"/>
+            <a:ext cx="3810000" cy="2540000"/>
           </a:xfrm>
           <a:prstGeom prst="rect">
             <a:avLst/>
@@ -3784,7 +3563,7 @@
     </p:spTree>
     <p:extLst>
       <p:ext uri="{BB962C8B-B14F-4D97-AF65-F5344CB8AC3E}">
-        <p14:creationId xmlns:p14="http://schemas.microsoft.com/office/powerpoint/2010/main" val="3250746773"/>
+        <p14:creationId xmlns:p14="http://schemas.microsoft.com/office/powerpoint/2010/main" val="3603118044"/>
       </p:ext>
     </p:extLst>
   </p:cSld>

</xml_diff>